<commit_message>
EC2 is a Virtual Computer and AWS instance
</commit_message>
<xml_diff>
--- a/03_VPC.pptx
+++ b/03_VPC.pptx
@@ -3881,7 +3881,7 @@
               <a:rPr lang="en-US" sz="1600" dirty="0">
                 <a:hlinkClick r:id="rId2"/>
               </a:rPr>
-              <a:t>https://www.youtube.com/watch?v=qcY-uiEHhn0&amp;list=PLv2a_5pNAko2Jl4Ks7V428ttvy-Fj4NKU&amp;index=2</a:t>
+              <a:t>https://www.youtube.com/watch?v=_V3dqC80FHU&amp;list=PLv2a_5pNAko2Jl4Ks7V428ttvy-Fj4NKU&amp;index=3</a:t>
             </a:r>
             <a:endParaRPr lang="en-US" sz="1600" b="1" i="1" dirty="0"/>
           </a:p>
@@ -4373,7 +4373,7 @@
               <a:rPr lang="en-US" sz="1600" dirty="0">
                 <a:hlinkClick r:id="rId2"/>
               </a:rPr>
-              <a:t>https://www.youtube.com/watch?v=qcY-uiEHhn0&amp;list=PLv2a_5pNAko2Jl4Ks7V428ttvy-Fj4NKU&amp;index=2</a:t>
+              <a:t>https://www.youtube.com/watch?v=_V3dqC80FHU&amp;list=PLv2a_5pNAko2Jl4Ks7V428ttvy-Fj4NKU&amp;index=3</a:t>
             </a:r>
             <a:endParaRPr lang="en-US" sz="1600" b="1" i="1" dirty="0"/>
           </a:p>
@@ -4660,7 +4660,7 @@
               <a:rPr lang="en-US" sz="1600" dirty="0">
                 <a:hlinkClick r:id="rId2"/>
               </a:rPr>
-              <a:t>https://www.youtube.com/watch?v=qcY-uiEHhn0&amp;list=PLv2a_5pNAko2Jl4Ks7V428ttvy-Fj4NKU&amp;index=2</a:t>
+              <a:t>https://www.youtube.com/watch?v=_V3dqC80FHU&amp;list=PLv2a_5pNAko2Jl4Ks7V428ttvy-Fj4NKU&amp;index=3</a:t>
             </a:r>
             <a:endParaRPr lang="en-US" sz="1600" b="1" i="1" dirty="0"/>
           </a:p>
@@ -4947,7 +4947,7 @@
               <a:rPr lang="en-US" sz="1600" dirty="0">
                 <a:hlinkClick r:id="rId2"/>
               </a:rPr>
-              <a:t>https://www.youtube.com/watch?v=qcY-uiEHhn0&amp;list=PLv2a_5pNAko2Jl4Ks7V428ttvy-Fj4NKU&amp;index=2</a:t>
+              <a:t>https://www.youtube.com/watch?v=_V3dqC80FHU&amp;list=PLv2a_5pNAko2Jl4Ks7V428ttvy-Fj4NKU&amp;index=3</a:t>
             </a:r>
             <a:endParaRPr lang="en-US" sz="1600" b="1" i="1" dirty="0"/>
           </a:p>
@@ -5234,7 +5234,7 @@
               <a:rPr lang="en-US" sz="1600" dirty="0">
                 <a:hlinkClick r:id="rId2"/>
               </a:rPr>
-              <a:t>https://www.youtube.com/watch?v=qcY-uiEHhn0&amp;list=PLv2a_5pNAko2Jl4Ks7V428ttvy-Fj4NKU&amp;index=2</a:t>
+              <a:t>https://www.youtube.com/watch?v=_V3dqC80FHU&amp;list=PLv2a_5pNAko2Jl4Ks7V428ttvy-Fj4NKU&amp;index=3</a:t>
             </a:r>
             <a:endParaRPr lang="en-US" sz="1600" b="1" i="1" dirty="0"/>
           </a:p>
@@ -5555,7 +5555,7 @@
               <a:rPr lang="en-US" sz="1600" dirty="0">
                 <a:hlinkClick r:id="rId2"/>
               </a:rPr>
-              <a:t>https://www.youtube.com/watch?v=qcY-uiEHhn0&amp;list=PLv2a_5pNAko2Jl4Ks7V428ttvy-Fj4NKU&amp;index=2</a:t>
+              <a:t>https://www.youtube.com/watch?v=_V3dqC80FHU&amp;list=PLv2a_5pNAko2Jl4Ks7V428ttvy-Fj4NKU&amp;index=3</a:t>
             </a:r>
             <a:endParaRPr lang="en-US" sz="1600" b="1" i="1" dirty="0"/>
           </a:p>
@@ -5859,7 +5859,7 @@
               <a:rPr lang="en-US" sz="1600" dirty="0">
                 <a:hlinkClick r:id="rId2"/>
               </a:rPr>
-              <a:t>https://www.youtube.com/watch?v=qcY-uiEHhn0&amp;list=PLv2a_5pNAko2Jl4Ks7V428ttvy-Fj4NKU&amp;index=2</a:t>
+              <a:t>https://www.youtube.com/watch?v=_V3dqC80FHU&amp;list=PLv2a_5pNAko2Jl4Ks7V428ttvy-Fj4NKU&amp;index=3</a:t>
             </a:r>
             <a:endParaRPr lang="en-US" sz="1600" b="1" i="1" dirty="0"/>
           </a:p>
@@ -6163,7 +6163,7 @@
               <a:rPr lang="en-US" sz="1600" dirty="0">
                 <a:hlinkClick r:id="rId2"/>
               </a:rPr>
-              <a:t>https://www.youtube.com/watch?v=qcY-uiEHhn0&amp;list=PLv2a_5pNAko2Jl4Ks7V428ttvy-Fj4NKU&amp;index=2</a:t>
+              <a:t>https://www.youtube.com/watch?v=_V3dqC80FHU&amp;list=PLv2a_5pNAko2Jl4Ks7V428ttvy-Fj4NKU&amp;index=3</a:t>
             </a:r>
             <a:endParaRPr lang="en-US" sz="1600" b="1" i="1" dirty="0"/>
           </a:p>
@@ -6467,7 +6467,7 @@
               <a:rPr lang="en-US" sz="1600" dirty="0">
                 <a:hlinkClick r:id="rId2"/>
               </a:rPr>
-              <a:t>https://www.youtube.com/watch?v=qcY-uiEHhn0&amp;list=PLv2a_5pNAko2Jl4Ks7V428ttvy-Fj4NKU&amp;index=2</a:t>
+              <a:t>https://www.youtube.com/watch?v=_V3dqC80FHU&amp;list=PLv2a_5pNAko2Jl4Ks7V428ttvy-Fj4NKU&amp;index=3</a:t>
             </a:r>
             <a:endParaRPr lang="en-US" sz="1600" b="1" i="1" dirty="0"/>
           </a:p>

</xml_diff>